<commit_message>
Comitando o projeto do quinto dia.
</commit_message>
<xml_diff>
--- a/apresentacoes/TreinamentoMaven_Dia-5_RepositorioOracle_Deploy_SCM.pptx
+++ b/apresentacoes/TreinamentoMaven_Dia-5_RepositorioOracle_Deploy_SCM.pptx
@@ -5527,77 +5527,140 @@
           <a:p>
             <a:pPr lvl="1"/>
             <a:r>
+              <a:rPr lang="en-US" sz="1400" dirty="0" err="1" smtClean="0">
+                <a:latin typeface="Consolas"/>
+                <a:cs typeface="Consolas"/>
+              </a:rPr>
+              <a:t>mvn</a:t>
+            </a:r>
+            <a:r>
+              <a:rPr lang="en-US" sz="1400" dirty="0" smtClean="0">
+                <a:latin typeface="Consolas"/>
+                <a:cs typeface="Consolas"/>
+              </a:rPr>
+              <a:t> </a:t>
+            </a:r>
+            <a:r>
+              <a:rPr lang="en-US" sz="1400" dirty="0">
+                <a:latin typeface="Consolas"/>
+                <a:cs typeface="Consolas"/>
+              </a:rPr>
+              <a:t>--encrypt-master-password</a:t>
+            </a:r>
+            <a:endParaRPr lang="pt-BR" sz="1400" dirty="0" smtClean="0">
+              <a:latin typeface="Consolas"/>
+              <a:cs typeface="Consolas"/>
+            </a:endParaRPr>
+          </a:p>
+          <a:p>
+            <a:r>
+              <a:rPr lang="pt-BR" dirty="0" smtClean="0"/>
+              <a:t>Criar arquivo </a:t>
+            </a:r>
+            <a:r>
+              <a:rPr lang="pt-BR" sz="1800" dirty="0" smtClean="0">
+                <a:latin typeface="Consolas" pitchFamily="49" charset="0"/>
+                <a:cs typeface="Consolas" pitchFamily="49" charset="0"/>
+              </a:rPr>
+              <a:t>~/.m2/</a:t>
+            </a:r>
+            <a:r>
+              <a:rPr lang="pt-BR" sz="1800" dirty="0" err="1" smtClean="0">
+                <a:latin typeface="Consolas" pitchFamily="49" charset="0"/>
+                <a:cs typeface="Consolas" pitchFamily="49" charset="0"/>
+              </a:rPr>
+              <a:t>settings-security</a:t>
+            </a:r>
+            <a:r>
+              <a:rPr lang="pt-BR" sz="1800" dirty="0" smtClean="0">
+                <a:latin typeface="Consolas" pitchFamily="49" charset="0"/>
+                <a:cs typeface="Consolas" pitchFamily="49" charset="0"/>
+              </a:rPr>
+              <a:t>.</a:t>
+            </a:r>
+            <a:r>
+              <a:rPr lang="pt-BR" sz="1800" dirty="0" err="1" smtClean="0">
+                <a:latin typeface="Consolas" pitchFamily="49" charset="0"/>
+                <a:cs typeface="Consolas" pitchFamily="49" charset="0"/>
+              </a:rPr>
+              <a:t>xml</a:t>
+            </a:r>
+            <a:r>
+              <a:rPr lang="pt-BR" sz="1800" dirty="0" smtClean="0">
+                <a:latin typeface="Consolas" pitchFamily="49" charset="0"/>
+                <a:cs typeface="Consolas" pitchFamily="49" charset="0"/>
+              </a:rPr>
+              <a:t> </a:t>
+            </a:r>
+            <a:r>
+              <a:rPr lang="pt-BR" dirty="0" smtClean="0"/>
+              <a:t>contendo senha mestre criptografada</a:t>
+            </a:r>
+          </a:p>
+          <a:p>
+            <a:pPr lvl="1">
+              <a:buNone/>
+            </a:pPr>
+            <a:r>
+              <a:rPr lang="pt-BR" sz="1400" dirty="0" smtClean="0">
+                <a:latin typeface="Consolas" pitchFamily="49" charset="0"/>
+                <a:cs typeface="Consolas" pitchFamily="49" charset="0"/>
+              </a:rPr>
+              <a:t>&lt;</a:t>
+            </a:r>
+            <a:r>
               <a:rPr lang="pt-BR" sz="1400" dirty="0" err="1" smtClean="0">
                 <a:latin typeface="Consolas" pitchFamily="49" charset="0"/>
                 <a:cs typeface="Consolas" pitchFamily="49" charset="0"/>
               </a:rPr>
-              <a:t>mvn</a:t>
+              <a:t>settingsSecurity</a:t>
             </a:r>
             <a:r>
               <a:rPr lang="pt-BR" sz="1400" dirty="0" smtClean="0">
                 <a:latin typeface="Consolas" pitchFamily="49" charset="0"/>
                 <a:cs typeface="Consolas" pitchFamily="49" charset="0"/>
               </a:rPr>
-              <a:t> –</a:t>
+              <a:t>&gt;</a:t>
+            </a:r>
+          </a:p>
+          <a:p>
+            <a:pPr lvl="1">
+              <a:buNone/>
+            </a:pPr>
+            <a:r>
+              <a:rPr lang="pt-BR" sz="1400" dirty="0" smtClean="0">
+                <a:latin typeface="Consolas" pitchFamily="49" charset="0"/>
+                <a:cs typeface="Consolas" pitchFamily="49" charset="0"/>
+              </a:rPr>
+              <a:t>    &lt;</a:t>
             </a:r>
             <a:r>
               <a:rPr lang="pt-BR" sz="1400" dirty="0" err="1" smtClean="0">
                 <a:latin typeface="Consolas" pitchFamily="49" charset="0"/>
                 <a:cs typeface="Consolas" pitchFamily="49" charset="0"/>
               </a:rPr>
-              <a:t>encrypt-master-password</a:t>
+              <a:t>master</a:t>
             </a:r>
             <a:r>
               <a:rPr lang="pt-BR" sz="1400" dirty="0" smtClean="0">
                 <a:latin typeface="Consolas" pitchFamily="49" charset="0"/>
                 <a:cs typeface="Consolas" pitchFamily="49" charset="0"/>
               </a:rPr>
-              <a:t> &lt;SENHA_MESTRE&gt;</a:t>
-            </a:r>
-          </a:p>
-          <a:p>
-            <a:r>
-              <a:rPr lang="pt-BR" dirty="0" smtClean="0"/>
-              <a:t>Criar arquivo </a:t>
-            </a:r>
-            <a:r>
-              <a:rPr lang="pt-BR" sz="1800" dirty="0" smtClean="0">
+              <a:t>&gt;{By8wW7YcTxAHof0MF4Z3wPKboywhGJvxHD9m0NvHA2U=}&lt;/</a:t>
+            </a:r>
+            <a:r>
+              <a:rPr lang="pt-BR" sz="1400" dirty="0" err="1" smtClean="0">
                 <a:latin typeface="Consolas" pitchFamily="49" charset="0"/>
                 <a:cs typeface="Consolas" pitchFamily="49" charset="0"/>
               </a:rPr>
-              <a:t>~/.m2/</a:t>
-            </a:r>
-            <a:r>
-              <a:rPr lang="pt-BR" sz="1800" dirty="0" err="1" smtClean="0">
+              <a:t>master</a:t>
+            </a:r>
+            <a:r>
+              <a:rPr lang="pt-BR" sz="1400" dirty="0" smtClean="0">
                 <a:latin typeface="Consolas" pitchFamily="49" charset="0"/>
                 <a:cs typeface="Consolas" pitchFamily="49" charset="0"/>
               </a:rPr>
-              <a:t>settings-security</a:t>
-            </a:r>
-            <a:r>
-              <a:rPr lang="pt-BR" sz="1800" dirty="0" smtClean="0">
-                <a:latin typeface="Consolas" pitchFamily="49" charset="0"/>
-                <a:cs typeface="Consolas" pitchFamily="49" charset="0"/>
-              </a:rPr>
-              <a:t>.</a:t>
-            </a:r>
-            <a:r>
-              <a:rPr lang="pt-BR" sz="1800" dirty="0" err="1" smtClean="0">
-                <a:latin typeface="Consolas" pitchFamily="49" charset="0"/>
-                <a:cs typeface="Consolas" pitchFamily="49" charset="0"/>
-              </a:rPr>
-              <a:t>xml</a:t>
-            </a:r>
-            <a:r>
-              <a:rPr lang="pt-BR" sz="1800" dirty="0" smtClean="0">
-                <a:latin typeface="Consolas" pitchFamily="49" charset="0"/>
-                <a:cs typeface="Consolas" pitchFamily="49" charset="0"/>
-              </a:rPr>
-              <a:t> </a:t>
-            </a:r>
-            <a:r>
-              <a:rPr lang="pt-BR" dirty="0" smtClean="0"/>
-              <a:t>contendo senha mestre criptografada</a:t>
+              <a:t>&gt;</a:t>
             </a:r>
           </a:p>
           <a:p>
@@ -5609,7 +5672,7 @@
                 <a:latin typeface="Consolas" pitchFamily="49" charset="0"/>
                 <a:cs typeface="Consolas" pitchFamily="49" charset="0"/>
               </a:rPr>
-              <a:t>&lt;</a:t>
+              <a:t>&lt;/</a:t>
             </a:r>
             <a:r>
               <a:rPr lang="pt-BR" sz="1400" dirty="0" err="1" smtClean="0">
@@ -5627,106 +5690,34 @@
             </a:r>
           </a:p>
           <a:p>
-            <a:pPr lvl="1">
-              <a:buNone/>
-            </a:pPr>
+            <a:r>
+              <a:rPr lang="pt-BR" dirty="0" smtClean="0"/>
+              <a:t>Criptografar a senha de acesso ao repositório</a:t>
+            </a:r>
+          </a:p>
+          <a:p>
+            <a:pPr lvl="1"/>
+            <a:r>
+              <a:rPr lang="en-US" sz="1400" dirty="0" err="1"/>
+              <a:t>mvn</a:t>
+            </a:r>
+            <a:r>
+              <a:rPr lang="en-US" sz="1400" dirty="0"/>
+              <a:t> --encrypt-password</a:t>
+            </a:r>
             <a:r>
               <a:rPr lang="pt-BR" sz="1400" dirty="0" smtClean="0">
                 <a:latin typeface="Consolas" pitchFamily="49" charset="0"/>
                 <a:cs typeface="Consolas" pitchFamily="49" charset="0"/>
               </a:rPr>
-              <a:t>    &lt;</a:t>
-            </a:r>
-            <a:r>
-              <a:rPr lang="pt-BR" sz="1400" dirty="0" err="1" smtClean="0">
-                <a:latin typeface="Consolas" pitchFamily="49" charset="0"/>
-                <a:cs typeface="Consolas" pitchFamily="49" charset="0"/>
-              </a:rPr>
-              <a:t>master</a:t>
+              <a:t> </a:t>
             </a:r>
             <a:r>
               <a:rPr lang="pt-BR" sz="1400" dirty="0" smtClean="0">
                 <a:latin typeface="Consolas" pitchFamily="49" charset="0"/>
                 <a:cs typeface="Consolas" pitchFamily="49" charset="0"/>
               </a:rPr>
-              <a:t>&gt;{By8wW7YcTxAHof0MF4Z3wPKboywhGJvxHD9m0NvHA2U=}&lt;/</a:t>
-            </a:r>
-            <a:r>
-              <a:rPr lang="pt-BR" sz="1400" dirty="0" err="1" smtClean="0">
-                <a:latin typeface="Consolas" pitchFamily="49" charset="0"/>
-                <a:cs typeface="Consolas" pitchFamily="49" charset="0"/>
-              </a:rPr>
-              <a:t>master</a:t>
-            </a:r>
-            <a:r>
-              <a:rPr lang="pt-BR" sz="1400" dirty="0" smtClean="0">
-                <a:latin typeface="Consolas" pitchFamily="49" charset="0"/>
-                <a:cs typeface="Consolas" pitchFamily="49" charset="0"/>
-              </a:rPr>
-              <a:t>&gt;</a:t>
-            </a:r>
-          </a:p>
-          <a:p>
-            <a:pPr lvl="1">
-              <a:buNone/>
-            </a:pPr>
-            <a:r>
-              <a:rPr lang="pt-BR" sz="1400" dirty="0" smtClean="0">
-                <a:latin typeface="Consolas" pitchFamily="49" charset="0"/>
-                <a:cs typeface="Consolas" pitchFamily="49" charset="0"/>
-              </a:rPr>
-              <a:t>&lt;/</a:t>
-            </a:r>
-            <a:r>
-              <a:rPr lang="pt-BR" sz="1400" dirty="0" err="1" smtClean="0">
-                <a:latin typeface="Consolas" pitchFamily="49" charset="0"/>
-                <a:cs typeface="Consolas" pitchFamily="49" charset="0"/>
-              </a:rPr>
-              <a:t>settingsSecurity</a:t>
-            </a:r>
-            <a:r>
-              <a:rPr lang="pt-BR" sz="1400" dirty="0" smtClean="0">
-                <a:latin typeface="Consolas" pitchFamily="49" charset="0"/>
-                <a:cs typeface="Consolas" pitchFamily="49" charset="0"/>
-              </a:rPr>
-              <a:t>&gt;</a:t>
-            </a:r>
-          </a:p>
-          <a:p>
-            <a:r>
-              <a:rPr lang="pt-BR" dirty="0" smtClean="0"/>
-              <a:t>Criptografar a senha de acesso ao repositório</a:t>
-            </a:r>
-          </a:p>
-          <a:p>
-            <a:pPr lvl="1"/>
-            <a:r>
-              <a:rPr lang="pt-BR" sz="1400" dirty="0" err="1" smtClean="0">
-                <a:latin typeface="Consolas" pitchFamily="49" charset="0"/>
-                <a:cs typeface="Consolas" pitchFamily="49" charset="0"/>
-              </a:rPr>
-              <a:t>Mvn</a:t>
-            </a:r>
-            <a:r>
-              <a:rPr lang="pt-BR" sz="1400" dirty="0" smtClean="0">
-                <a:latin typeface="Consolas" pitchFamily="49" charset="0"/>
-                <a:cs typeface="Consolas" pitchFamily="49" charset="0"/>
-              </a:rPr>
-              <a:t> –</a:t>
-            </a:r>
-            <a:r>
-              <a:rPr lang="pt-BR" sz="1400" dirty="0" err="1" smtClean="0">
-                <a:latin typeface="Consolas" pitchFamily="49" charset="0"/>
-                <a:cs typeface="Consolas" pitchFamily="49" charset="0"/>
-              </a:rPr>
-              <a:t>encrypt-password</a:t>
-            </a:r>
-            <a:r>
-              <a:rPr lang="pt-BR" sz="1400" dirty="0" smtClean="0">
-                <a:latin typeface="Consolas" pitchFamily="49" charset="0"/>
-                <a:cs typeface="Consolas" pitchFamily="49" charset="0"/>
-              </a:rPr>
-              <a:t> &lt;SENHA_DO_REPOSITORIO&gt;</a:t>
+              <a:t>&lt;SENHA_DO_REPOSITORIO&gt;</a:t>
             </a:r>
           </a:p>
           <a:p>

</xml_diff>